<commit_message>
index html header changes
</commit_message>
<xml_diff>
--- a/Marketing Automation for Network4cars Part 2.pptx
+++ b/Marketing Automation for Network4cars Part 2.pptx
@@ -1329,581 +1329,6 @@
       <dsp:cNvGrpSpPr/>
     </dsp:nvGrpSpPr>
     <dsp:grpSpPr/>
-    <dsp:sp modelId="{BA8BF9D6-A595-4F1D-BF02-637A66A9B3DC}">
-      <dsp:nvSpPr>
-        <dsp:cNvPr id="0" name=""/>
-        <dsp:cNvSpPr/>
-      </dsp:nvSpPr>
-      <dsp:spPr>
-        <a:xfrm>
-          <a:off x="4113586" y="24238"/>
-          <a:ext cx="853755" cy="853755"/>
-        </a:xfrm>
-        <a:prstGeom prst="rect">
-          <a:avLst/>
-        </a:prstGeom>
-        <a:noFill/>
-        <a:ln>
-          <a:noFill/>
-        </a:ln>
-        <a:effectLst/>
-      </dsp:spPr>
-      <dsp:style>
-        <a:lnRef idx="0">
-          <a:scrgbClr r="0" g="0" b="0"/>
-        </a:lnRef>
-        <a:fillRef idx="0">
-          <a:scrgbClr r="0" g="0" b="0"/>
-        </a:fillRef>
-        <a:effectRef idx="0">
-          <a:scrgbClr r="0" g="0" b="0"/>
-        </a:effectRef>
-        <a:fontRef idx="minor"/>
-      </dsp:style>
-      <dsp:txBody>
-        <a:bodyPr spcFirstLastPara="0" vert="horz" wrap="square" lIns="17780" tIns="17780" rIns="17780" bIns="17780" numCol="1" spcCol="1270" anchor="ctr" anchorCtr="0">
-          <a:noAutofit/>
-        </a:bodyPr>
-        <a:lstStyle/>
-        <a:p>
-          <a:pPr lvl="0" algn="ctr" defTabSz="622300">
-            <a:lnSpc>
-              <a:spcPct val="90000"/>
-            </a:lnSpc>
-            <a:spcBef>
-              <a:spcPct val="0"/>
-            </a:spcBef>
-            <a:spcAft>
-              <a:spcPct val="35000"/>
-            </a:spcAft>
-          </a:pPr>
-          <a:r>
-            <a:rPr lang="en-GB" sz="1400" kern="1200" dirty="0" smtClean="0"/>
-            <a:t>Learn</a:t>
-          </a:r>
-          <a:endParaRPr lang="en-US" sz="1400" kern="1200" dirty="0"/>
-        </a:p>
-      </dsp:txBody>
-      <dsp:txXfrm>
-        <a:off x="4113586" y="24238"/>
-        <a:ext cx="853755" cy="853755"/>
-      </dsp:txXfrm>
-    </dsp:sp>
-    <dsp:sp modelId="{4593AB70-B902-4D25-9AF7-C4D4F424D14B}">
-      <dsp:nvSpPr>
-        <dsp:cNvPr id="0" name=""/>
-        <dsp:cNvSpPr/>
-      </dsp:nvSpPr>
-      <dsp:spPr>
-        <a:xfrm>
-          <a:off x="2101729" y="-883"/>
-          <a:ext cx="3205402" cy="3205402"/>
-        </a:xfrm>
-        <a:prstGeom prst="circularArrow">
-          <a:avLst>
-            <a:gd name="adj1" fmla="val 5194"/>
-            <a:gd name="adj2" fmla="val 335450"/>
-            <a:gd name="adj3" fmla="val 21295127"/>
-            <a:gd name="adj4" fmla="val 19764587"/>
-            <a:gd name="adj5" fmla="val 6059"/>
-          </a:avLst>
-        </a:prstGeom>
-        <a:solidFill>
-          <a:schemeClr val="accent1">
-            <a:hueOff val="0"/>
-            <a:satOff val="0"/>
-            <a:lumOff val="0"/>
-            <a:alphaOff val="0"/>
-          </a:schemeClr>
-        </a:solidFill>
-        <a:ln w="19050" cap="flat" cmpd="sng" algn="ctr">
-          <a:solidFill>
-            <a:schemeClr val="lt1">
-              <a:hueOff val="0"/>
-              <a:satOff val="0"/>
-              <a:lumOff val="0"/>
-              <a:alphaOff val="0"/>
-            </a:schemeClr>
-          </a:solidFill>
-          <a:prstDash val="solid"/>
-        </a:ln>
-        <a:effectLst/>
-      </dsp:spPr>
-      <dsp:style>
-        <a:lnRef idx="2">
-          <a:scrgbClr r="0" g="0" b="0"/>
-        </a:lnRef>
-        <a:fillRef idx="1">
-          <a:scrgbClr r="0" g="0" b="0"/>
-        </a:fillRef>
-        <a:effectRef idx="0">
-          <a:scrgbClr r="0" g="0" b="0"/>
-        </a:effectRef>
-        <a:fontRef idx="minor">
-          <a:schemeClr val="lt1"/>
-        </a:fontRef>
-      </dsp:style>
-    </dsp:sp>
-    <dsp:sp modelId="{2C12F855-CE33-42FE-87E1-A7D1D7183420}">
-      <dsp:nvSpPr>
-        <dsp:cNvPr id="0" name=""/>
-        <dsp:cNvSpPr/>
-      </dsp:nvSpPr>
-      <dsp:spPr>
-        <a:xfrm>
-          <a:off x="4630283" y="1614468"/>
-          <a:ext cx="853755" cy="853755"/>
-        </a:xfrm>
-        <a:prstGeom prst="rect">
-          <a:avLst/>
-        </a:prstGeom>
-        <a:noFill/>
-        <a:ln>
-          <a:noFill/>
-        </a:ln>
-        <a:effectLst/>
-      </dsp:spPr>
-      <dsp:style>
-        <a:lnRef idx="0">
-          <a:scrgbClr r="0" g="0" b="0"/>
-        </a:lnRef>
-        <a:fillRef idx="0">
-          <a:scrgbClr r="0" g="0" b="0"/>
-        </a:fillRef>
-        <a:effectRef idx="0">
-          <a:scrgbClr r="0" g="0" b="0"/>
-        </a:effectRef>
-        <a:fontRef idx="minor"/>
-      </dsp:style>
-      <dsp:txBody>
-        <a:bodyPr spcFirstLastPara="0" vert="horz" wrap="square" lIns="17780" tIns="17780" rIns="17780" bIns="17780" numCol="1" spcCol="1270" anchor="ctr" anchorCtr="0">
-          <a:noAutofit/>
-        </a:bodyPr>
-        <a:lstStyle/>
-        <a:p>
-          <a:pPr lvl="0" algn="ctr" defTabSz="622300">
-            <a:lnSpc>
-              <a:spcPct val="90000"/>
-            </a:lnSpc>
-            <a:spcBef>
-              <a:spcPct val="0"/>
-            </a:spcBef>
-            <a:spcAft>
-              <a:spcPct val="35000"/>
-            </a:spcAft>
-          </a:pPr>
-          <a:r>
-            <a:rPr lang="en-GB" sz="1400" kern="1200" dirty="0" smtClean="0"/>
-            <a:t>Try</a:t>
-          </a:r>
-          <a:endParaRPr lang="en-US" sz="1400" kern="1200" dirty="0"/>
-        </a:p>
-      </dsp:txBody>
-      <dsp:txXfrm>
-        <a:off x="4630283" y="1614468"/>
-        <a:ext cx="853755" cy="853755"/>
-      </dsp:txXfrm>
-    </dsp:sp>
-    <dsp:sp modelId="{26F3CDFF-BC84-4092-A815-647DD17483BD}">
-      <dsp:nvSpPr>
-        <dsp:cNvPr id="0" name=""/>
-        <dsp:cNvSpPr/>
-      </dsp:nvSpPr>
-      <dsp:spPr>
-        <a:xfrm>
-          <a:off x="2101729" y="-883"/>
-          <a:ext cx="3205402" cy="3205402"/>
-        </a:xfrm>
-        <a:prstGeom prst="circularArrow">
-          <a:avLst>
-            <a:gd name="adj1" fmla="val 5194"/>
-            <a:gd name="adj2" fmla="val 335450"/>
-            <a:gd name="adj3" fmla="val 4016652"/>
-            <a:gd name="adj4" fmla="val 2251639"/>
-            <a:gd name="adj5" fmla="val 6059"/>
-          </a:avLst>
-        </a:prstGeom>
-        <a:solidFill>
-          <a:schemeClr val="accent1">
-            <a:hueOff val="0"/>
-            <a:satOff val="0"/>
-            <a:lumOff val="0"/>
-            <a:alphaOff val="0"/>
-          </a:schemeClr>
-        </a:solidFill>
-        <a:ln w="19050" cap="flat" cmpd="sng" algn="ctr">
-          <a:solidFill>
-            <a:schemeClr val="lt1">
-              <a:hueOff val="0"/>
-              <a:satOff val="0"/>
-              <a:lumOff val="0"/>
-              <a:alphaOff val="0"/>
-            </a:schemeClr>
-          </a:solidFill>
-          <a:prstDash val="solid"/>
-        </a:ln>
-        <a:effectLst/>
-      </dsp:spPr>
-      <dsp:style>
-        <a:lnRef idx="2">
-          <a:scrgbClr r="0" g="0" b="0"/>
-        </a:lnRef>
-        <a:fillRef idx="1">
-          <a:scrgbClr r="0" g="0" b="0"/>
-        </a:fillRef>
-        <a:effectRef idx="0">
-          <a:scrgbClr r="0" g="0" b="0"/>
-        </a:effectRef>
-        <a:fontRef idx="minor">
-          <a:schemeClr val="lt1"/>
-        </a:fontRef>
-      </dsp:style>
-    </dsp:sp>
-    <dsp:sp modelId="{43E10DE1-0DCC-4993-AC34-CF3026F82A7F}">
-      <dsp:nvSpPr>
-        <dsp:cNvPr id="0" name=""/>
-        <dsp:cNvSpPr/>
-      </dsp:nvSpPr>
-      <dsp:spPr>
-        <a:xfrm>
-          <a:off x="3277553" y="2597285"/>
-          <a:ext cx="853755" cy="853755"/>
-        </a:xfrm>
-        <a:prstGeom prst="rect">
-          <a:avLst/>
-        </a:prstGeom>
-        <a:noFill/>
-        <a:ln>
-          <a:noFill/>
-        </a:ln>
-        <a:effectLst/>
-      </dsp:spPr>
-      <dsp:style>
-        <a:lnRef idx="0">
-          <a:scrgbClr r="0" g="0" b="0"/>
-        </a:lnRef>
-        <a:fillRef idx="0">
-          <a:scrgbClr r="0" g="0" b="0"/>
-        </a:fillRef>
-        <a:effectRef idx="0">
-          <a:scrgbClr r="0" g="0" b="0"/>
-        </a:effectRef>
-        <a:fontRef idx="minor"/>
-      </dsp:style>
-      <dsp:txBody>
-        <a:bodyPr spcFirstLastPara="0" vert="horz" wrap="square" lIns="17780" tIns="17780" rIns="17780" bIns="17780" numCol="1" spcCol="1270" anchor="ctr" anchorCtr="0">
-          <a:noAutofit/>
-        </a:bodyPr>
-        <a:lstStyle/>
-        <a:p>
-          <a:pPr lvl="0" algn="ctr" defTabSz="622300">
-            <a:lnSpc>
-              <a:spcPct val="90000"/>
-            </a:lnSpc>
-            <a:spcBef>
-              <a:spcPct val="0"/>
-            </a:spcBef>
-            <a:spcAft>
-              <a:spcPct val="35000"/>
-            </a:spcAft>
-          </a:pPr>
-          <a:r>
-            <a:rPr lang="en-GB" sz="1400" kern="1200" dirty="0" smtClean="0"/>
-            <a:t>Buy</a:t>
-          </a:r>
-          <a:endParaRPr lang="en-US" sz="1400" kern="1200" dirty="0"/>
-        </a:p>
-      </dsp:txBody>
-      <dsp:txXfrm>
-        <a:off x="3277553" y="2597285"/>
-        <a:ext cx="853755" cy="853755"/>
-      </dsp:txXfrm>
-    </dsp:sp>
-    <dsp:sp modelId="{4C7B1EB5-C308-48A9-BC6D-F74B58CA6635}">
-      <dsp:nvSpPr>
-        <dsp:cNvPr id="0" name=""/>
-        <dsp:cNvSpPr/>
-      </dsp:nvSpPr>
-      <dsp:spPr>
-        <a:xfrm>
-          <a:off x="2101729" y="-883"/>
-          <a:ext cx="3205402" cy="3205402"/>
-        </a:xfrm>
-        <a:prstGeom prst="circularArrow">
-          <a:avLst>
-            <a:gd name="adj1" fmla="val 5194"/>
-            <a:gd name="adj2" fmla="val 335450"/>
-            <a:gd name="adj3" fmla="val 8212911"/>
-            <a:gd name="adj4" fmla="val 6447898"/>
-            <a:gd name="adj5" fmla="val 6059"/>
-          </a:avLst>
-        </a:prstGeom>
-        <a:solidFill>
-          <a:schemeClr val="accent1">
-            <a:hueOff val="0"/>
-            <a:satOff val="0"/>
-            <a:lumOff val="0"/>
-            <a:alphaOff val="0"/>
-          </a:schemeClr>
-        </a:solidFill>
-        <a:ln w="19050" cap="flat" cmpd="sng" algn="ctr">
-          <a:solidFill>
-            <a:schemeClr val="lt1">
-              <a:hueOff val="0"/>
-              <a:satOff val="0"/>
-              <a:lumOff val="0"/>
-              <a:alphaOff val="0"/>
-            </a:schemeClr>
-          </a:solidFill>
-          <a:prstDash val="solid"/>
-        </a:ln>
-        <a:effectLst/>
-      </dsp:spPr>
-      <dsp:style>
-        <a:lnRef idx="2">
-          <a:scrgbClr r="0" g="0" b="0"/>
-        </a:lnRef>
-        <a:fillRef idx="1">
-          <a:scrgbClr r="0" g="0" b="0"/>
-        </a:fillRef>
-        <a:effectRef idx="0">
-          <a:scrgbClr r="0" g="0" b="0"/>
-        </a:effectRef>
-        <a:fontRef idx="minor">
-          <a:schemeClr val="lt1"/>
-        </a:fontRef>
-      </dsp:style>
-    </dsp:sp>
-    <dsp:sp modelId="{E351507B-05DA-4CDA-9BE7-F60150A057E7}">
-      <dsp:nvSpPr>
-        <dsp:cNvPr id="0" name=""/>
-        <dsp:cNvSpPr/>
-      </dsp:nvSpPr>
-      <dsp:spPr>
-        <a:xfrm>
-          <a:off x="1924822" y="1614468"/>
-          <a:ext cx="853755" cy="853755"/>
-        </a:xfrm>
-        <a:prstGeom prst="rect">
-          <a:avLst/>
-        </a:prstGeom>
-        <a:noFill/>
-        <a:ln>
-          <a:noFill/>
-        </a:ln>
-        <a:effectLst/>
-      </dsp:spPr>
-      <dsp:style>
-        <a:lnRef idx="0">
-          <a:scrgbClr r="0" g="0" b="0"/>
-        </a:lnRef>
-        <a:fillRef idx="0">
-          <a:scrgbClr r="0" g="0" b="0"/>
-        </a:fillRef>
-        <a:effectRef idx="0">
-          <a:scrgbClr r="0" g="0" b="0"/>
-        </a:effectRef>
-        <a:fontRef idx="minor"/>
-      </dsp:style>
-      <dsp:txBody>
-        <a:bodyPr spcFirstLastPara="0" vert="horz" wrap="square" lIns="17780" tIns="17780" rIns="17780" bIns="17780" numCol="1" spcCol="1270" anchor="ctr" anchorCtr="0">
-          <a:noAutofit/>
-        </a:bodyPr>
-        <a:lstStyle/>
-        <a:p>
-          <a:pPr lvl="0" algn="ctr" defTabSz="622300">
-            <a:lnSpc>
-              <a:spcPct val="90000"/>
-            </a:lnSpc>
-            <a:spcBef>
-              <a:spcPct val="0"/>
-            </a:spcBef>
-            <a:spcAft>
-              <a:spcPct val="35000"/>
-            </a:spcAft>
-          </a:pPr>
-          <a:r>
-            <a:rPr lang="en-GB" sz="1400" kern="1200" dirty="0" smtClean="0"/>
-            <a:t>Propagate</a:t>
-          </a:r>
-          <a:endParaRPr lang="en-US" sz="1400" kern="1200" dirty="0"/>
-        </a:p>
-      </dsp:txBody>
-      <dsp:txXfrm>
-        <a:off x="1924822" y="1614468"/>
-        <a:ext cx="853755" cy="853755"/>
-      </dsp:txXfrm>
-    </dsp:sp>
-    <dsp:sp modelId="{6A4C8F65-92D7-4E59-8C09-5FA5296855EC}">
-      <dsp:nvSpPr>
-        <dsp:cNvPr id="0" name=""/>
-        <dsp:cNvSpPr/>
-      </dsp:nvSpPr>
-      <dsp:spPr>
-        <a:xfrm>
-          <a:off x="2101729" y="-883"/>
-          <a:ext cx="3205402" cy="3205402"/>
-        </a:xfrm>
-        <a:prstGeom prst="circularArrow">
-          <a:avLst>
-            <a:gd name="adj1" fmla="val 5194"/>
-            <a:gd name="adj2" fmla="val 335450"/>
-            <a:gd name="adj3" fmla="val 12299963"/>
-            <a:gd name="adj4" fmla="val 10769423"/>
-            <a:gd name="adj5" fmla="val 6059"/>
-          </a:avLst>
-        </a:prstGeom>
-        <a:solidFill>
-          <a:schemeClr val="accent1">
-            <a:hueOff val="0"/>
-            <a:satOff val="0"/>
-            <a:lumOff val="0"/>
-            <a:alphaOff val="0"/>
-          </a:schemeClr>
-        </a:solidFill>
-        <a:ln w="19050" cap="flat" cmpd="sng" algn="ctr">
-          <a:solidFill>
-            <a:schemeClr val="lt1">
-              <a:hueOff val="0"/>
-              <a:satOff val="0"/>
-              <a:lumOff val="0"/>
-              <a:alphaOff val="0"/>
-            </a:schemeClr>
-          </a:solidFill>
-          <a:prstDash val="solid"/>
-        </a:ln>
-        <a:effectLst/>
-      </dsp:spPr>
-      <dsp:style>
-        <a:lnRef idx="2">
-          <a:scrgbClr r="0" g="0" b="0"/>
-        </a:lnRef>
-        <a:fillRef idx="1">
-          <a:scrgbClr r="0" g="0" b="0"/>
-        </a:fillRef>
-        <a:effectRef idx="0">
-          <a:scrgbClr r="0" g="0" b="0"/>
-        </a:effectRef>
-        <a:fontRef idx="minor">
-          <a:schemeClr val="lt1"/>
-        </a:fontRef>
-      </dsp:style>
-    </dsp:sp>
-    <dsp:sp modelId="{9E5B56E0-1B18-4ED7-9A1E-925CC12CDEC8}">
-      <dsp:nvSpPr>
-        <dsp:cNvPr id="0" name=""/>
-        <dsp:cNvSpPr/>
-      </dsp:nvSpPr>
-      <dsp:spPr>
-        <a:xfrm>
-          <a:off x="2441519" y="24238"/>
-          <a:ext cx="853755" cy="853755"/>
-        </a:xfrm>
-        <a:prstGeom prst="rect">
-          <a:avLst/>
-        </a:prstGeom>
-        <a:noFill/>
-        <a:ln>
-          <a:noFill/>
-        </a:ln>
-        <a:effectLst/>
-      </dsp:spPr>
-      <dsp:style>
-        <a:lnRef idx="0">
-          <a:scrgbClr r="0" g="0" b="0"/>
-        </a:lnRef>
-        <a:fillRef idx="0">
-          <a:scrgbClr r="0" g="0" b="0"/>
-        </a:fillRef>
-        <a:effectRef idx="0">
-          <a:scrgbClr r="0" g="0" b="0"/>
-        </a:effectRef>
-        <a:fontRef idx="minor"/>
-      </dsp:style>
-      <dsp:txBody>
-        <a:bodyPr spcFirstLastPara="0" vert="horz" wrap="square" lIns="17780" tIns="17780" rIns="17780" bIns="17780" numCol="1" spcCol="1270" anchor="ctr" anchorCtr="0">
-          <a:noAutofit/>
-        </a:bodyPr>
-        <a:lstStyle/>
-        <a:p>
-          <a:pPr lvl="0" algn="ctr" defTabSz="622300">
-            <a:lnSpc>
-              <a:spcPct val="90000"/>
-            </a:lnSpc>
-            <a:spcBef>
-              <a:spcPct val="0"/>
-            </a:spcBef>
-            <a:spcAft>
-              <a:spcPct val="35000"/>
-            </a:spcAft>
-          </a:pPr>
-          <a:r>
-            <a:rPr lang="en-GB" sz="1400" kern="1200" dirty="0" smtClean="0"/>
-            <a:t>Discover</a:t>
-          </a:r>
-          <a:endParaRPr lang="en-US" sz="1400" kern="1200" dirty="0"/>
-        </a:p>
-      </dsp:txBody>
-      <dsp:txXfrm>
-        <a:off x="2441519" y="24238"/>
-        <a:ext cx="853755" cy="853755"/>
-      </dsp:txXfrm>
-    </dsp:sp>
-    <dsp:sp modelId="{BDA131D9-E225-4178-8BC3-03290301CEA4}">
-      <dsp:nvSpPr>
-        <dsp:cNvPr id="0" name=""/>
-        <dsp:cNvSpPr/>
-      </dsp:nvSpPr>
-      <dsp:spPr>
-        <a:xfrm>
-          <a:off x="2101729" y="-883"/>
-          <a:ext cx="3205402" cy="3205402"/>
-        </a:xfrm>
-        <a:prstGeom prst="circularArrow">
-          <a:avLst>
-            <a:gd name="adj1" fmla="val 5194"/>
-            <a:gd name="adj2" fmla="val 335450"/>
-            <a:gd name="adj3" fmla="val 16867635"/>
-            <a:gd name="adj4" fmla="val 15196915"/>
-            <a:gd name="adj5" fmla="val 6059"/>
-          </a:avLst>
-        </a:prstGeom>
-        <a:solidFill>
-          <a:schemeClr val="accent1">
-            <a:hueOff val="0"/>
-            <a:satOff val="0"/>
-            <a:lumOff val="0"/>
-            <a:alphaOff val="0"/>
-          </a:schemeClr>
-        </a:solidFill>
-        <a:ln w="19050" cap="flat" cmpd="sng" algn="ctr">
-          <a:solidFill>
-            <a:schemeClr val="lt1">
-              <a:hueOff val="0"/>
-              <a:satOff val="0"/>
-              <a:lumOff val="0"/>
-              <a:alphaOff val="0"/>
-            </a:schemeClr>
-          </a:solidFill>
-          <a:prstDash val="solid"/>
-        </a:ln>
-        <a:effectLst/>
-      </dsp:spPr>
-      <dsp:style>
-        <a:lnRef idx="2">
-          <a:scrgbClr r="0" g="0" b="0"/>
-        </a:lnRef>
-        <a:fillRef idx="1">
-          <a:scrgbClr r="0" g="0" b="0"/>
-        </a:fillRef>
-        <a:effectRef idx="0">
-          <a:scrgbClr r="0" g="0" b="0"/>
-        </a:effectRef>
-        <a:fontRef idx="minor">
-          <a:schemeClr val="lt1"/>
-        </a:fontRef>
-      </dsp:style>
-    </dsp:sp>
   </dsp:spTree>
 </dsp:drawing>
 </file>
@@ -3222,7 +2647,7 @@
           <a:p>
             <a:fld id="{2CCF36E8-A5E5-45ED-BE86-6A5774501F93}" type="datetimeFigureOut">
               <a:rPr lang="en-US" smtClean="0"/>
-              <a:t>6/20/2017</a:t>
+              <a:t>6/21/2017</a:t>
             </a:fld>
             <a:endParaRPr lang="en-US"/>
           </a:p>
@@ -5348,7 +4773,7 @@
           <a:p>
             <a:fld id="{C7740982-4C07-45D9-83E2-34FF5EB0E1D3}" type="datetimeFigureOut">
               <a:rPr lang="en-US" smtClean="0"/>
-              <a:t>6/20/2017</a:t>
+              <a:t>6/21/2017</a:t>
             </a:fld>
             <a:endParaRPr lang="en-US"/>
           </a:p>
@@ -5531,7 +4956,7 @@
           <a:p>
             <a:fld id="{BA776908-7CED-49C4-9DEC-A1005F2F9065}" type="datetimeFigureOut">
               <a:rPr lang="en-US" smtClean="0"/>
-              <a:t>6/20/2017</a:t>
+              <a:t>6/21/2017</a:t>
             </a:fld>
             <a:endParaRPr lang="en-US"/>
           </a:p>
@@ -5706,7 +5131,7 @@
           <a:p>
             <a:fld id="{BA776908-7CED-49C4-9DEC-A1005F2F9065}" type="datetimeFigureOut">
               <a:rPr lang="en-US" smtClean="0"/>
-              <a:t>6/20/2017</a:t>
+              <a:t>6/21/2017</a:t>
             </a:fld>
             <a:endParaRPr lang="en-US"/>
           </a:p>
@@ -5871,7 +5296,7 @@
           <a:p>
             <a:fld id="{BA776908-7CED-49C4-9DEC-A1005F2F9065}" type="datetimeFigureOut">
               <a:rPr lang="en-US" smtClean="0"/>
-              <a:t>6/20/2017</a:t>
+              <a:t>6/21/2017</a:t>
             </a:fld>
             <a:endParaRPr lang="en-US"/>
           </a:p>
@@ -6092,7 +5517,7 @@
           <a:p>
             <a:fld id="{BA776908-7CED-49C4-9DEC-A1005F2F9065}" type="datetimeFigureOut">
               <a:rPr lang="en-US" smtClean="0"/>
-              <a:t>6/20/2017</a:t>
+              <a:t>6/21/2017</a:t>
             </a:fld>
             <a:endParaRPr lang="en-US"/>
           </a:p>
@@ -6351,7 +5776,7 @@
           <a:p>
             <a:fld id="{BA776908-7CED-49C4-9DEC-A1005F2F9065}" type="datetimeFigureOut">
               <a:rPr lang="en-US" smtClean="0"/>
-              <a:t>6/20/2017</a:t>
+              <a:t>6/21/2017</a:t>
             </a:fld>
             <a:endParaRPr lang="en-US"/>
           </a:p>
@@ -6755,7 +6180,7 @@
           <a:p>
             <a:fld id="{BA776908-7CED-49C4-9DEC-A1005F2F9065}" type="datetimeFigureOut">
               <a:rPr lang="en-US" smtClean="0"/>
-              <a:t>6/20/2017</a:t>
+              <a:t>6/21/2017</a:t>
             </a:fld>
             <a:endParaRPr lang="en-US"/>
           </a:p>
@@ -6886,7 +6311,7 @@
           <a:p>
             <a:fld id="{BA776908-7CED-49C4-9DEC-A1005F2F9065}" type="datetimeFigureOut">
               <a:rPr lang="en-US" smtClean="0"/>
-              <a:t>6/20/2017</a:t>
+              <a:t>6/21/2017</a:t>
             </a:fld>
             <a:endParaRPr lang="en-US"/>
           </a:p>
@@ -6986,7 +6411,7 @@
           <a:p>
             <a:fld id="{BA776908-7CED-49C4-9DEC-A1005F2F9065}" type="datetimeFigureOut">
               <a:rPr lang="en-US" smtClean="0"/>
-              <a:t>6/20/2017</a:t>
+              <a:t>6/21/2017</a:t>
             </a:fld>
             <a:endParaRPr lang="en-US"/>
           </a:p>
@@ -7231,7 +6656,7 @@
           <a:p>
             <a:fld id="{BA776908-7CED-49C4-9DEC-A1005F2F9065}" type="datetimeFigureOut">
               <a:rPr lang="en-US" smtClean="0"/>
-              <a:t>6/20/2017</a:t>
+              <a:t>6/21/2017</a:t>
             </a:fld>
             <a:endParaRPr lang="en-US"/>
           </a:p>
@@ -7475,7 +6900,7 @@
           <a:p>
             <a:fld id="{BA776908-7CED-49C4-9DEC-A1005F2F9065}" type="datetimeFigureOut">
               <a:rPr lang="en-US" smtClean="0"/>
-              <a:t>6/20/2017</a:t>
+              <a:t>6/21/2017</a:t>
             </a:fld>
             <a:endParaRPr lang="en-US"/>
           </a:p>
@@ -8299,7 +7724,7 @@
           <a:p>
             <a:fld id="{BA776908-7CED-49C4-9DEC-A1005F2F9065}" type="datetimeFigureOut">
               <a:rPr lang="en-US" smtClean="0"/>
-              <a:t>6/20/2017</a:t>
+              <a:t>6/21/2017</a:t>
             </a:fld>
             <a:endParaRPr lang="en-US"/>
           </a:p>
@@ -9562,13 +8987,8 @@
             </a:pPr>
             <a:r>
               <a:rPr lang="en-GB" dirty="0" smtClean="0"/>
-              <a:t>Push-Pull </a:t>
-            </a:r>
-            <a:r>
-              <a:rPr lang="en-GB" dirty="0" smtClean="0"/>
-              <a:t>strategy : To align purchase based on customer choice.</a:t>
-            </a:r>
-            <a:endParaRPr lang="en-GB" dirty="0" smtClean="0"/>
+              <a:t>Push-Pull strategy : To align purchase based on customer choice.</a:t>
+            </a:r>
           </a:p>
           <a:p>
             <a:pPr marL="0" indent="0">
@@ -12600,9 +12020,28 @@
             </a:pPr>
             <a:r>
               <a:rPr lang="en-GB" sz="3600" dirty="0" smtClean="0"/>
-              <a:t>Questions /Doubts/Clarifications!</a:t>
-            </a:r>
-            <a:endParaRPr lang="en-US" sz="3600" dirty="0"/>
+              <a:t>Questions /Doubts/Clarifications</a:t>
+            </a:r>
+            <a:r>
+              <a:rPr lang="en-GB" sz="3600" dirty="0" smtClean="0"/>
+              <a:t>!</a:t>
+            </a:r>
+          </a:p>
+          <a:p>
+            <a:pPr marL="0" indent="0" algn="ctr">
+              <a:buNone/>
+            </a:pPr>
+            <a:r>
+              <a:rPr lang="en-GB" dirty="0" smtClean="0"/>
+              <a:t>Sample - Network4Cars App </a:t>
+            </a:r>
+            <a:r>
+              <a:rPr lang="en-GB" dirty="0" smtClean="0">
+                <a:hlinkClick r:id="rId2"/>
+              </a:rPr>
+              <a:t>Link</a:t>
+            </a:r>
+            <a:endParaRPr lang="en-US" dirty="0"/>
           </a:p>
         </p:txBody>
       </p:sp>

</xml_diff>